<commit_message>
Within sub regression iEP, vel, acc
</commit_message>
<xml_diff>
--- a/analysis/figures/2022_12_11_vel_acc_iep.pptx
+++ b/analysis/figures/2022_12_11_vel_acc_iep.pptx
@@ -10,6 +10,7 @@
     <p:sldId id="258" r:id="rId4"/>
     <p:sldId id="260" r:id="rId5"/>
     <p:sldId id="259" r:id="rId6"/>
+    <p:sldId id="261" r:id="rId7"/>
   </p:sldIdLst>
   <p:sldSz cx="12192000" cy="6858000"/>
   <p:notesSz cx="6858000" cy="9144000"/>
@@ -7804,6 +7805,188 @@
 </p:sld>
 </file>
 
+<file path=ppt/slides/slide6.xml><?xml version="1.0" encoding="utf-8"?>
+<p:sld xmlns:a="http://schemas.openxmlformats.org/drawingml/2006/main" xmlns:r="http://schemas.openxmlformats.org/officeDocument/2006/relationships" xmlns:p="http://schemas.openxmlformats.org/presentationml/2006/main">
+  <p:cSld>
+    <p:spTree>
+      <p:nvGrpSpPr>
+        <p:cNvPr id="1" name=""/>
+        <p:cNvGrpSpPr/>
+        <p:nvPr/>
+      </p:nvGrpSpPr>
+      <p:grpSpPr>
+        <a:xfrm>
+          <a:off x="0" y="0"/>
+          <a:ext cx="0" cy="0"/>
+          <a:chOff x="0" y="0"/>
+          <a:chExt cx="0" cy="0"/>
+        </a:xfrm>
+      </p:grpSpPr>
+      <p:pic>
+        <p:nvPicPr>
+          <p:cNvPr id="10" name="Picture 9">
+            <a:extLst>
+              <a:ext uri="{FF2B5EF4-FFF2-40B4-BE49-F238E27FC236}">
+                <a16:creationId xmlns:a16="http://schemas.microsoft.com/office/drawing/2014/main" id="{44E072DE-60D3-DB2B-3D63-5B7D91F7F421}"/>
+              </a:ext>
+            </a:extLst>
+          </p:cNvPr>
+          <p:cNvPicPr>
+            <a:picLocks noChangeAspect="1"/>
+          </p:cNvPicPr>
+          <p:nvPr/>
+        </p:nvPicPr>
+        <p:blipFill>
+          <a:blip r:embed="rId2"/>
+          <a:stretch>
+            <a:fillRect/>
+          </a:stretch>
+        </p:blipFill>
+        <p:spPr>
+          <a:xfrm>
+            <a:off x="312024" y="2324695"/>
+            <a:ext cx="7017620" cy="4141418"/>
+          </a:xfrm>
+          <a:prstGeom prst="rect">
+            <a:avLst/>
+          </a:prstGeom>
+        </p:spPr>
+      </p:pic>
+      <p:sp>
+        <p:nvSpPr>
+          <p:cNvPr id="11" name="TextBox 10">
+            <a:extLst>
+              <a:ext uri="{FF2B5EF4-FFF2-40B4-BE49-F238E27FC236}">
+                <a16:creationId xmlns:a16="http://schemas.microsoft.com/office/drawing/2014/main" id="{103FB8AF-883B-4AA6-DFD1-DE5670EDE4EC}"/>
+              </a:ext>
+            </a:extLst>
+          </p:cNvPr>
+          <p:cNvSpPr txBox="1"/>
+          <p:nvPr/>
+        </p:nvSpPr>
+        <p:spPr>
+          <a:xfrm>
+            <a:off x="255685" y="2252008"/>
+            <a:ext cx="6920838" cy="338554"/>
+          </a:xfrm>
+          <a:prstGeom prst="rect">
+            <a:avLst/>
+          </a:prstGeom>
+          <a:solidFill>
+            <a:schemeClr val="bg1"/>
+          </a:solidFill>
+        </p:spPr>
+        <p:txBody>
+          <a:bodyPr wrap="square" rtlCol="1">
+            <a:spAutoFit/>
+          </a:bodyPr>
+          <a:lstStyle/>
+          <a:p>
+            <a:pPr algn="ctr"/>
+            <a:endParaRPr lang="he-IL" sz="1600" dirty="0"/>
+          </a:p>
+        </p:txBody>
+      </p:sp>
+      <p:pic>
+        <p:nvPicPr>
+          <p:cNvPr id="12" name="Picture 11">
+            <a:extLst>
+              <a:ext uri="{FF2B5EF4-FFF2-40B4-BE49-F238E27FC236}">
+                <a16:creationId xmlns:a16="http://schemas.microsoft.com/office/drawing/2014/main" id="{1A019485-22E4-B010-9A9E-20E534C4635F}"/>
+              </a:ext>
+            </a:extLst>
+          </p:cNvPr>
+          <p:cNvPicPr>
+            <a:picLocks noChangeAspect="1"/>
+          </p:cNvPicPr>
+          <p:nvPr/>
+        </p:nvPicPr>
+        <p:blipFill rotWithShape="1">
+          <a:blip r:embed="rId3"/>
+          <a:srcRect l="65455" t="3765" r="8756" b="4637"/>
+          <a:stretch/>
+        </p:blipFill>
+        <p:spPr>
+          <a:xfrm>
+            <a:off x="8058421" y="333691"/>
+            <a:ext cx="3635932" cy="6524309"/>
+          </a:xfrm>
+          <a:prstGeom prst="rect">
+            <a:avLst/>
+          </a:prstGeom>
+        </p:spPr>
+      </p:pic>
+      <p:sp>
+        <p:nvSpPr>
+          <p:cNvPr id="6" name="TextBox 5">
+            <a:extLst>
+              <a:ext uri="{FF2B5EF4-FFF2-40B4-BE49-F238E27FC236}">
+                <a16:creationId xmlns:a16="http://schemas.microsoft.com/office/drawing/2014/main" id="{94ECDF2E-EA6D-9E80-7C2A-F672565E02BA}"/>
+              </a:ext>
+            </a:extLst>
+          </p:cNvPr>
+          <p:cNvSpPr txBox="1"/>
+          <p:nvPr/>
+        </p:nvSpPr>
+        <p:spPr>
+          <a:xfrm>
+            <a:off x="709997" y="1821121"/>
+            <a:ext cx="6148634" cy="861774"/>
+          </a:xfrm>
+          <a:prstGeom prst="rect">
+            <a:avLst/>
+          </a:prstGeom>
+          <a:noFill/>
+        </p:spPr>
+        <p:txBody>
+          <a:bodyPr wrap="square" rtlCol="1">
+            <a:spAutoFit/>
+          </a:bodyPr>
+          <a:lstStyle/>
+          <a:p>
+            <a:pPr algn="ctr"/>
+            <a:r>
+              <a:rPr lang="en-US" b="1" u="sng" dirty="0" err="1"/>
+              <a:t>iEP</a:t>
+            </a:r>
+            <a:r>
+              <a:rPr lang="en-US" b="1" u="sng" dirty="0"/>
+              <a:t> with side as a random intercept and slope</a:t>
+            </a:r>
+          </a:p>
+          <a:p>
+            <a:pPr algn="ctr"/>
+            <a:r>
+              <a:rPr lang="en-US" sz="1600" dirty="0" err="1"/>
+              <a:t>iEP</a:t>
+            </a:r>
+            <a:r>
+              <a:rPr lang="en-US" sz="1600" dirty="0"/>
+              <a:t> at each sample was normalized within participant.</a:t>
+            </a:r>
+          </a:p>
+          <a:p>
+            <a:pPr algn="ctr"/>
+            <a:r>
+              <a:rPr lang="en-US" sz="1600" dirty="0"/>
+              <a:t>Shade is CI.</a:t>
+            </a:r>
+          </a:p>
+        </p:txBody>
+      </p:sp>
+    </p:spTree>
+    <p:extLst>
+      <p:ext uri="{BB962C8B-B14F-4D97-AF65-F5344CB8AC3E}">
+        <p14:creationId xmlns:p14="http://schemas.microsoft.com/office/powerpoint/2010/main" val="1931942695"/>
+      </p:ext>
+    </p:extLst>
+  </p:cSld>
+  <p:clrMapOvr>
+    <a:masterClrMapping/>
+  </p:clrMapOvr>
+</p:sld>
+</file>
+
 <file path=ppt/theme/theme1.xml><?xml version="1.0" encoding="utf-8"?>
 <a:theme xmlns:a="http://schemas.openxmlformats.org/drawingml/2006/main" name="Office Theme">
   <a:themeElements>

</xml_diff>